<commit_message>
Update picture capture and edit.pptx
</commit_message>
<xml_diff>
--- a/Pictures/picture capture and edit.pptx
+++ b/Pictures/picture capture and edit.pptx
@@ -124,6 +124,11 @@
       </a:defRPr>
     </a:lvl9pPr>
   </p:defaultTextStyle>
+  <p:extLst>
+    <p:ext uri="{EFAFB233-063F-42B5-8137-9DF3F51BA10A}">
+      <p15:sldGuideLst xmlns:p15="http://schemas.microsoft.com/office/powerpoint/2012/main"/>
+    </p:ext>
+  </p:extLst>
 </p:presentation>
 </file>
 
@@ -4398,7 +4403,7 @@
                 <a:latin typeface="TH SarabunPSK" panose="020B0500040200020003" pitchFamily="34" charset="-34"/>
                 <a:cs typeface="TH SarabunPSK" panose="020B0500040200020003" pitchFamily="34" charset="-34"/>
               </a:rPr>
-              <a:t>1. ไขเนื้อหา</a:t>
+              <a:t>1. แก้ไขเนื้อหา</a:t>
             </a:r>
           </a:p>
         </p:txBody>

</xml_diff>